<commit_message>
Config files support + samples
</commit_message>
<xml_diff>
--- a/MetaReader.pptx
+++ b/MetaReader.pptx
@@ -10272,18 +10272,7 @@
                 </a:schemeClr>
               </a:solidFill>
             </a:rPr>
-            <a:t>Semantic (zip code, phone</a:t>
-          </a:r>
-          <a:r>
-            <a:rPr lang="en-US" smtClean="0">
-              <a:solidFill>
-                <a:schemeClr val="accent4">
-                  <a:lumMod val="20000"/>
-                  <a:lumOff val="80000"/>
-                </a:schemeClr>
-              </a:solidFill>
-            </a:rPr>
-            <a:t>, geo)*</a:t>
+            <a:t>Semantic (zip code, phone, geo)*</a:t>
           </a:r>
           <a:endParaRPr lang="en-US" dirty="0">
             <a:solidFill>
@@ -14745,18 +14734,7 @@
                 </a:schemeClr>
               </a:solidFill>
             </a:rPr>
-            <a:t>Semantic (zip code, phone</a:t>
-          </a:r>
-          <a:r>
-            <a:rPr lang="en-US" sz="2000" kern="1200" smtClean="0">
-              <a:solidFill>
-                <a:schemeClr val="accent4">
-                  <a:lumMod val="20000"/>
-                  <a:lumOff val="80000"/>
-                </a:schemeClr>
-              </a:solidFill>
-            </a:rPr>
-            <a:t>, geo)*</a:t>
+            <a:t>Semantic (zip code, phone, geo)*</a:t>
           </a:r>
           <a:endParaRPr lang="en-US" sz="2000" kern="1200" dirty="0">
             <a:solidFill>

</xml_diff>

<commit_message>
new dataset + loading page
</commit_message>
<xml_diff>
--- a/MetaReader.pptx
+++ b/MetaReader.pptx
@@ -7097,7 +7097,7 @@
           </a:r>
           <a:r>
             <a:rPr lang="en-US" dirty="0" smtClean="0"/>
-            <a:t>-admin template</a:t>
+            <a:t>-admin</a:t>
           </a:r>
           <a:endParaRPr lang="en-US" dirty="0" smtClean="0"/>
         </a:p>
@@ -7124,6 +7124,29 @@
           <a:endParaRPr lang="en-US"/>
         </a:p>
       </dgm:t>
+    </dgm:pt>
+    <dgm:pt modelId="{BC87F096-1655-442D-AAB2-59FE521787D0}">
+      <dgm:prSet/>
+      <dgm:spPr/>
+      <dgm:t>
+        <a:bodyPr/>
+        <a:lstStyle/>
+        <a:p>
+          <a:r>
+            <a:rPr lang="en-US" dirty="0" smtClean="0"/>
+            <a:t>spin.js</a:t>
+          </a:r>
+          <a:endParaRPr lang="en-US" dirty="0" smtClean="0"/>
+        </a:p>
+      </dgm:t>
+    </dgm:pt>
+    <dgm:pt modelId="{C14FA182-BED6-4307-AA70-499C95852A20}" type="parTrans" cxnId="{BB5192B5-DDEE-498B-A387-9658B0DD2195}">
+      <dgm:prSet/>
+      <dgm:spPr/>
+    </dgm:pt>
+    <dgm:pt modelId="{494D489B-053E-4AA0-BB56-99B8D3BD050A}" type="sibTrans" cxnId="{BB5192B5-DDEE-498B-A387-9658B0DD2195}">
+      <dgm:prSet/>
+      <dgm:spPr/>
     </dgm:pt>
     <dgm:pt modelId="{981B4B1B-C988-4852-B6E0-F792050B10E7}" type="pres">
       <dgm:prSet presAssocID="{16432026-08C8-4FDF-952F-70B894A0F2C9}" presName="Name0" presStyleCnt="0">
@@ -7239,6 +7262,7 @@
     </dgm:pt>
   </dgm:ptLst>
   <dgm:cxnLst>
+    <dgm:cxn modelId="{2AF68813-2848-4703-A121-35F656856A29}" type="presOf" srcId="{BC87F096-1655-442D-AAB2-59FE521787D0}" destId="{0D4DD5A7-0189-437C-B4B7-58DF7AC058CB}" srcOrd="0" destOrd="2" presId="urn:microsoft.com/office/officeart/2005/8/layout/hList1"/>
     <dgm:cxn modelId="{1CBF67AA-5025-4C20-A0F1-42DDFAEE690E}" type="presOf" srcId="{B7C6B522-5942-4552-9A0D-A9E40A69AAE0}" destId="{96614094-6FF2-4F0B-AB42-64D6898BBF3F}" srcOrd="0" destOrd="0" presId="urn:microsoft.com/office/officeart/2005/8/layout/hList1"/>
     <dgm:cxn modelId="{20C9D86E-E1D3-4967-AE64-AAE26DDB48F0}" srcId="{16432026-08C8-4FDF-952F-70B894A0F2C9}" destId="{46F98585-F61E-4394-9DDD-1E9BDB3FE089}" srcOrd="1" destOrd="0" parTransId="{12849EDE-FD47-47C1-8353-FC06F071D833}" sibTransId="{95DD92F6-AA47-4814-890D-ABF254CC29A4}"/>
     <dgm:cxn modelId="{4FB02648-3ABE-4268-BE78-C32F958F2474}" srcId="{1716EAD0-6BDE-4000-9C21-FA99FC5026C6}" destId="{6A1EC90D-CF3F-41E4-B43A-C9BACBC370FC}" srcOrd="1" destOrd="0" parTransId="{4FFF8375-76F6-4A0E-81C6-B0ED2A4271C3}" sibTransId="{4E3C67B5-89D4-4E76-BAEB-FDDCB01AABF7}"/>
@@ -7250,6 +7274,7 @@
     <dgm:cxn modelId="{A1D04D15-00AF-4CE7-92D4-3D29ED241063}" srcId="{B7C6B522-5942-4552-9A0D-A9E40A69AAE0}" destId="{C7299359-851B-445F-B270-3E9CB452B140}" srcOrd="0" destOrd="0" parTransId="{50F87B91-7691-4B18-A64B-8C35C041FA3B}" sibTransId="{A0BB2542-58DB-468D-9213-603095510640}"/>
     <dgm:cxn modelId="{B4FF2722-06DD-4F0E-8D02-2E0209A4AE67}" srcId="{1716EAD0-6BDE-4000-9C21-FA99FC5026C6}" destId="{E8202AC7-574D-4231-BED2-77B87374F649}" srcOrd="0" destOrd="0" parTransId="{408656AB-8B26-4A82-8263-979EF6332274}" sibTransId="{79D4236A-A2E0-43AC-B27A-2DA64EC7C3FD}"/>
     <dgm:cxn modelId="{63EBDDF0-3552-4C5B-9498-C9D5F91D46BE}" type="presOf" srcId="{1716EAD0-6BDE-4000-9C21-FA99FC5026C6}" destId="{216D6703-4CD4-4BA3-B42D-BA5B33DCD020}" srcOrd="0" destOrd="0" presId="urn:microsoft.com/office/officeart/2005/8/layout/hList1"/>
+    <dgm:cxn modelId="{BB5192B5-DDEE-498B-A387-9658B0DD2195}" srcId="{46F98585-F61E-4394-9DDD-1E9BDB3FE089}" destId="{BC87F096-1655-442D-AAB2-59FE521787D0}" srcOrd="2" destOrd="0" parTransId="{C14FA182-BED6-4307-AA70-499C95852A20}" sibTransId="{494D489B-053E-4AA0-BB56-99B8D3BD050A}"/>
     <dgm:cxn modelId="{0B58F4D4-1285-4C3C-9B28-0511C9E19AB0}" type="presOf" srcId="{E87260ED-1681-4D6B-9AE2-E03AC34D4292}" destId="{43C479ED-BB90-4461-BF2E-312070E0AFCC}" srcOrd="0" destOrd="1" presId="urn:microsoft.com/office/officeart/2005/8/layout/hList1"/>
     <dgm:cxn modelId="{FBA1D8B1-FEBC-4D84-87EC-2AA84022E535}" srcId="{46F98585-F61E-4394-9DDD-1E9BDB3FE089}" destId="{FCBF33A9-146D-421C-8AEE-03A7D81E7D80}" srcOrd="1" destOrd="0" parTransId="{7173838E-253F-4D58-BE99-2A09899E7563}" sibTransId="{87509FD2-581C-4CDC-959A-9F28D50468A5}"/>
     <dgm:cxn modelId="{DBAB29AA-77E9-4989-89D7-296ED77459E5}" srcId="{46F98585-F61E-4394-9DDD-1E9BDB3FE089}" destId="{14FF61F1-D79B-4E16-9F45-8F9A4F15DD14}" srcOrd="0" destOrd="0" parTransId="{9D01B84C-60CB-4E71-BF71-8173230F9F17}" sibTransId="{4A028F60-14E6-4D83-B8E9-5A757879A652}"/>
@@ -11118,7 +11143,7 @@
       </dsp:nvSpPr>
       <dsp:spPr>
         <a:xfrm>
-          <a:off x="2464" y="59622"/>
+          <a:off x="2464" y="16388"/>
           <a:ext cx="2402978" cy="691200"/>
         </a:xfrm>
         <a:prstGeom prst="rect">
@@ -11185,7 +11210,7 @@
         </a:p>
       </dsp:txBody>
       <dsp:txXfrm>
-        <a:off x="2464" y="59622"/>
+        <a:off x="2464" y="16388"/>
         <a:ext cx="2402978" cy="691200"/>
       </dsp:txXfrm>
     </dsp:sp>
@@ -11196,8 +11221,8 @@
       </dsp:nvSpPr>
       <dsp:spPr>
         <a:xfrm>
-          <a:off x="2464" y="750822"/>
-          <a:ext cx="2402978" cy="1383480"/>
+          <a:off x="2464" y="707588"/>
+          <a:ext cx="2402978" cy="1469947"/>
         </a:xfrm>
         <a:prstGeom prst="rect">
           <a:avLst/>
@@ -11289,8 +11314,8 @@
         </a:p>
       </dsp:txBody>
       <dsp:txXfrm>
-        <a:off x="2464" y="750822"/>
-        <a:ext cx="2402978" cy="1383480"/>
+        <a:off x="2464" y="707588"/>
+        <a:ext cx="2402978" cy="1469947"/>
       </dsp:txXfrm>
     </dsp:sp>
     <dsp:sp modelId="{C101A671-B8CD-426A-87DC-9F27FBBB0989}">
@@ -11300,7 +11325,7 @@
       </dsp:nvSpPr>
       <dsp:spPr>
         <a:xfrm>
-          <a:off x="2741860" y="59622"/>
+          <a:off x="2741860" y="16388"/>
           <a:ext cx="2402978" cy="691200"/>
         </a:xfrm>
         <a:prstGeom prst="rect">
@@ -11367,7 +11392,7 @@
         </a:p>
       </dsp:txBody>
       <dsp:txXfrm>
-        <a:off x="2741860" y="59622"/>
+        <a:off x="2741860" y="16388"/>
         <a:ext cx="2402978" cy="691200"/>
       </dsp:txXfrm>
     </dsp:sp>
@@ -11378,8 +11403,8 @@
       </dsp:nvSpPr>
       <dsp:spPr>
         <a:xfrm>
-          <a:off x="2741860" y="750822"/>
-          <a:ext cx="2402978" cy="1383480"/>
+          <a:off x="2741860" y="707588"/>
+          <a:ext cx="2402978" cy="1469947"/>
         </a:xfrm>
         <a:prstGeom prst="rect">
           <a:avLst/>
@@ -11465,14 +11490,33 @@
           </a:r>
           <a:r>
             <a:rPr lang="en-US" sz="2400" kern="1200" dirty="0" smtClean="0"/>
-            <a:t>-admin template</a:t>
+            <a:t>-admin</a:t>
+          </a:r>
+          <a:endParaRPr lang="en-US" sz="2400" kern="1200" dirty="0" smtClean="0"/>
+        </a:p>
+        <a:p>
+          <a:pPr marL="228600" lvl="1" indent="-228600" algn="l" defTabSz="1066800">
+            <a:lnSpc>
+              <a:spcPct val="90000"/>
+            </a:lnSpc>
+            <a:spcBef>
+              <a:spcPct val="0"/>
+            </a:spcBef>
+            <a:spcAft>
+              <a:spcPct val="15000"/>
+            </a:spcAft>
+            <a:buChar char="••"/>
+          </a:pPr>
+          <a:r>
+            <a:rPr lang="en-US" sz="2400" kern="1200" dirty="0" smtClean="0"/>
+            <a:t>spin.js</a:t>
           </a:r>
           <a:endParaRPr lang="en-US" sz="2400" kern="1200" dirty="0" smtClean="0"/>
         </a:p>
       </dsp:txBody>
       <dsp:txXfrm>
-        <a:off x="2741860" y="750822"/>
-        <a:ext cx="2402978" cy="1383480"/>
+        <a:off x="2741860" y="707588"/>
+        <a:ext cx="2402978" cy="1469947"/>
       </dsp:txXfrm>
     </dsp:sp>
     <dsp:sp modelId="{216D6703-4CD4-4BA3-B42D-BA5B33DCD020}">
@@ -11482,7 +11526,7 @@
       </dsp:nvSpPr>
       <dsp:spPr>
         <a:xfrm>
-          <a:off x="5481256" y="59622"/>
+          <a:off x="5481256" y="16388"/>
           <a:ext cx="2402978" cy="691200"/>
         </a:xfrm>
         <a:prstGeom prst="rect">
@@ -11549,7 +11593,7 @@
         </a:p>
       </dsp:txBody>
       <dsp:txXfrm>
-        <a:off x="5481256" y="59622"/>
+        <a:off x="5481256" y="16388"/>
         <a:ext cx="2402978" cy="691200"/>
       </dsp:txXfrm>
     </dsp:sp>
@@ -11560,8 +11604,8 @@
       </dsp:nvSpPr>
       <dsp:spPr>
         <a:xfrm>
-          <a:off x="5481256" y="750822"/>
-          <a:ext cx="2402978" cy="1383480"/>
+          <a:off x="5481256" y="707588"/>
+          <a:ext cx="2402978" cy="1469947"/>
         </a:xfrm>
         <a:prstGeom prst="rect">
           <a:avLst/>
@@ -11649,8 +11693,8 @@
         </a:p>
       </dsp:txBody>
       <dsp:txXfrm>
-        <a:off x="5481256" y="750822"/>
-        <a:ext cx="2402978" cy="1383480"/>
+        <a:off x="5481256" y="707588"/>
+        <a:ext cx="2402978" cy="1469947"/>
       </dsp:txXfrm>
     </dsp:sp>
   </dsp:spTree>
@@ -30985,20 +31029,26 @@
           <a:lstStyle/>
           <a:p>
             <a:r>
-              <a:rPr lang="en-US" smtClean="0"/>
+              <a:rPr lang="en-US" dirty="0" smtClean="0"/>
               <a:t>.CSV Only</a:t>
             </a:r>
           </a:p>
           <a:p>
             <a:r>
-              <a:rPr lang="en-US" smtClean="0"/>
+              <a:rPr lang="en-US" dirty="0" smtClean="0"/>
+              <a:t>Column names must be unique</a:t>
+            </a:r>
+          </a:p>
+          <a:p>
+            <a:r>
+              <a:rPr lang="en-US" dirty="0" smtClean="0"/>
               <a:t>Limited file size (~1MB)</a:t>
             </a:r>
           </a:p>
           <a:p>
             <a:pPr lvl="1"/>
             <a:r>
-              <a:rPr lang="en-US" smtClean="0"/>
+              <a:rPr lang="en-US" dirty="0" smtClean="0"/>
               <a:t>Image mode workaround</a:t>
             </a:r>
             <a:endParaRPr lang="en-US" dirty="0"/>
@@ -31564,7 +31614,7 @@
             <p:ph idx="1"/>
             <p:extLst>
               <p:ext uri="{D42A27DB-BD31-4B8C-83A1-F6EECF244321}">
-                <p14:modId xmlns:p14="http://schemas.microsoft.com/office/powerpoint/2010/main" val="3388665207"/>
+                <p14:modId xmlns:p14="http://schemas.microsoft.com/office/powerpoint/2010/main" val="3318871796"/>
               </p:ext>
             </p:extLst>
           </p:nvPr>
@@ -31931,20 +31981,19 @@
           <a:p>
             <a:r>
               <a:rPr lang="en-US" dirty="0" smtClean="0"/>
-              <a:t>Customized by</a:t>
-            </a:r>
-          </a:p>
-          <a:p>
-            <a:pPr lvl="1"/>
-            <a:r>
-              <a:rPr lang="en-US" dirty="0" smtClean="0"/>
-              <a:t>Date Type + Column statistics</a:t>
+              <a:t>Customized by Type + Statistics</a:t>
             </a:r>
           </a:p>
           <a:p>
             <a:r>
               <a:rPr lang="en-US" dirty="0" smtClean="0"/>
-              <a:t>Most use original data ordering for x-axis (index)</a:t>
+              <a:t>Most use original data ordering for x-axis (Index)</a:t>
+            </a:r>
+          </a:p>
+          <a:p>
+            <a:r>
+              <a:rPr lang="en-US" dirty="0" smtClean="0"/>
+              <a:t>Downloadable as Images</a:t>
             </a:r>
           </a:p>
         </p:txBody>

</xml_diff>